<commit_message>
+ adding perf plot
</commit_message>
<xml_diff>
--- a/docs/conservative_interp_pletzer_17Jan2017.pptx
+++ b/docs/conservative_interp_pletzer_17Jan2017.pptx
@@ -11,6 +11,7 @@
     <p:sldId id="259" r:id="rId5"/>
     <p:sldId id="270" r:id="rId6"/>
     <p:sldId id="271" r:id="rId7"/>
+    <p:sldId id="274" r:id="rId8"/>
   </p:sldIdLst>
   <p:sldSz cx="12192000" cy="6858000"/>
   <p:notesSz cx="6858000" cy="9144000"/>
@@ -3023,13 +3024,8 @@
           <a:p>
             <a:r>
               <a:rPr lang="en-US" dirty="0" smtClean="0"/>
-              <a:t>Alexander Pletzer </a:t>
-            </a:r>
-            <a:r>
-              <a:rPr lang="en-US" dirty="0" smtClean="0"/>
-              <a:t>and Chris Scott 17 Jan 2017</a:t>
-            </a:r>
-            <a:endParaRPr lang="en-US" dirty="0" smtClean="0"/>
+              <a:t>Alexander Pletzer and Chris Scott 17 Jan 2017</a:t>
+            </a:r>
           </a:p>
           <a:p>
             <a:endParaRPr lang="en-US" dirty="0"/>
@@ -4039,7 +4035,6 @@
               <a:rPr lang="en-NZ" sz="2800" dirty="0"/>
               <a:t>: {srcCellIndex0: area0, srcCellIndex1: area1, …}</a:t>
             </a:r>
-            <a:endParaRPr lang="en-NZ" sz="2800" dirty="0"/>
           </a:p>
         </p:txBody>
       </p:sp>
@@ -4262,11 +4257,7 @@
           <a:p>
             <a:r>
               <a:rPr lang="en-US" dirty="0" smtClean="0"/>
-              <a:t>Use the grid to grid intersection points to triangulat</a:t>
-            </a:r>
-            <a:r>
-              <a:rPr lang="en-US" dirty="0" smtClean="0"/>
-              <a:t>e each </a:t>
+              <a:t>Use the grid to grid intersection points to triangulate each </a:t>
             </a:r>
             <a:r>
               <a:rPr lang="en-US" dirty="0" err="1" smtClean="0"/>
@@ -8289,6 +8280,256 @@
     <p:extLst>
       <p:ext uri="{BB962C8B-B14F-4D97-AF65-F5344CB8AC3E}">
         <p14:creationId xmlns:p14="http://schemas.microsoft.com/office/powerpoint/2010/main" val="546925235"/>
+      </p:ext>
+    </p:extLst>
+  </p:cSld>
+  <p:clrMapOvr>
+    <a:masterClrMapping/>
+  </p:clrMapOvr>
+</p:sld>
+</file>
+
+<file path=ppt/slides/slide7.xml><?xml version="1.0" encoding="utf-8"?>
+<p:sld xmlns:a="http://schemas.openxmlformats.org/drawingml/2006/main" xmlns:r="http://schemas.openxmlformats.org/officeDocument/2006/relationships" xmlns:p="http://schemas.openxmlformats.org/presentationml/2006/main">
+  <p:cSld>
+    <p:spTree>
+      <p:nvGrpSpPr>
+        <p:cNvPr id="1" name=""/>
+        <p:cNvGrpSpPr/>
+        <p:nvPr/>
+      </p:nvGrpSpPr>
+      <p:grpSpPr>
+        <a:xfrm>
+          <a:off x="0" y="0"/>
+          <a:ext cx="0" cy="0"/>
+          <a:chOff x="0" y="0"/>
+          <a:chExt cx="0" cy="0"/>
+        </a:xfrm>
+      </p:grpSpPr>
+      <p:sp>
+        <p:nvSpPr>
+          <p:cNvPr id="2" name="Title 1"/>
+          <p:cNvSpPr>
+            <a:spLocks noGrp="1"/>
+          </p:cNvSpPr>
+          <p:nvPr>
+            <p:ph type="title"/>
+          </p:nvPr>
+        </p:nvSpPr>
+        <p:spPr/>
+        <p:txBody>
+          <a:bodyPr/>
+          <a:lstStyle/>
+          <a:p>
+            <a:r>
+              <a:rPr lang="en-NZ" dirty="0" smtClean="0"/>
+              <a:t>ESMF performance scales as </a:t>
+            </a:r>
+            <a:r>
+              <a:rPr lang="en-NZ" dirty="0" err="1" smtClean="0"/>
+              <a:t>sqrt</a:t>
+            </a:r>
+            <a:r>
+              <a:rPr lang="en-NZ" dirty="0" smtClean="0"/>
+              <a:t>(N * M)</a:t>
+            </a:r>
+            <a:endParaRPr lang="en-NZ" dirty="0"/>
+          </a:p>
+        </p:txBody>
+      </p:sp>
+      <p:pic>
+        <p:nvPicPr>
+          <p:cNvPr id="4" name="Content Placeholder 3"/>
+          <p:cNvPicPr>
+            <a:picLocks noGrp="1" noChangeAspect="1"/>
+          </p:cNvPicPr>
+          <p:nvPr>
+            <p:ph idx="1"/>
+          </p:nvPr>
+        </p:nvPicPr>
+        <p:blipFill>
+          <a:blip r:embed="rId2">
+            <a:extLst>
+              <a:ext uri="{28A0092B-C50C-407E-A947-70E740481C1C}">
+                <a14:useLocalDpi xmlns:a14="http://schemas.microsoft.com/office/drawing/2010/main" val="0"/>
+              </a:ext>
+            </a:extLst>
+          </a:blip>
+          <a:stretch>
+            <a:fillRect/>
+          </a:stretch>
+        </p:blipFill>
+        <p:spPr>
+          <a:xfrm>
+            <a:off x="2930065" y="1891885"/>
+            <a:ext cx="5683848" cy="4262886"/>
+          </a:xfrm>
+        </p:spPr>
+      </p:pic>
+      <p:cxnSp>
+        <p:nvCxnSpPr>
+          <p:cNvPr id="6" name="Straight Connector 5"/>
+          <p:cNvCxnSpPr/>
+          <p:nvPr/>
+        </p:nvCxnSpPr>
+        <p:spPr>
+          <a:xfrm flipV="1">
+            <a:off x="3644348" y="2531165"/>
+            <a:ext cx="4426226" cy="2411896"/>
+          </a:xfrm>
+          <a:prstGeom prst="line">
+            <a:avLst/>
+          </a:prstGeom>
+        </p:spPr>
+        <p:style>
+          <a:lnRef idx="1">
+            <a:schemeClr val="accent1"/>
+          </a:lnRef>
+          <a:fillRef idx="0">
+            <a:schemeClr val="accent1"/>
+          </a:fillRef>
+          <a:effectRef idx="0">
+            <a:schemeClr val="accent1"/>
+          </a:effectRef>
+          <a:fontRef idx="minor">
+            <a:schemeClr val="tx1"/>
+          </a:fontRef>
+        </p:style>
+      </p:cxnSp>
+      <p:cxnSp>
+        <p:nvCxnSpPr>
+          <p:cNvPr id="8" name="Straight Connector 7"/>
+          <p:cNvCxnSpPr/>
+          <p:nvPr/>
+        </p:nvCxnSpPr>
+        <p:spPr>
+          <a:xfrm flipV="1">
+            <a:off x="4572000" y="3617844"/>
+            <a:ext cx="3498574" cy="1007165"/>
+          </a:xfrm>
+          <a:prstGeom prst="line">
+            <a:avLst/>
+          </a:prstGeom>
+          <a:ln>
+            <a:solidFill>
+              <a:srgbClr val="FF0000"/>
+            </a:solidFill>
+          </a:ln>
+        </p:spPr>
+        <p:style>
+          <a:lnRef idx="1">
+            <a:schemeClr val="accent1"/>
+          </a:lnRef>
+          <a:fillRef idx="0">
+            <a:schemeClr val="accent1"/>
+          </a:fillRef>
+          <a:effectRef idx="0">
+            <a:schemeClr val="accent1"/>
+          </a:effectRef>
+          <a:fontRef idx="minor">
+            <a:schemeClr val="tx1"/>
+          </a:fontRef>
+        </p:style>
+      </p:cxnSp>
+      <p:sp>
+        <p:nvSpPr>
+          <p:cNvPr id="12" name="TextBox 11"/>
+          <p:cNvSpPr txBox="1"/>
+          <p:nvPr/>
+        </p:nvSpPr>
+        <p:spPr>
+          <a:xfrm>
+            <a:off x="8481391" y="3617844"/>
+            <a:ext cx="2153154" cy="523220"/>
+          </a:xfrm>
+          <a:prstGeom prst="rect">
+            <a:avLst/>
+          </a:prstGeom>
+          <a:noFill/>
+        </p:spPr>
+        <p:txBody>
+          <a:bodyPr wrap="none" rtlCol="0">
+            <a:spAutoFit/>
+          </a:bodyPr>
+          <a:lstStyle/>
+          <a:p>
+            <a:r>
+              <a:rPr lang="en-NZ" sz="2800" dirty="0" smtClean="0">
+                <a:solidFill>
+                  <a:srgbClr val="FF0000"/>
+                </a:solidFill>
+              </a:rPr>
+              <a:t>O(</a:t>
+            </a:r>
+            <a:r>
+              <a:rPr lang="en-NZ" sz="2800" dirty="0" err="1" smtClean="0">
+                <a:solidFill>
+                  <a:srgbClr val="FF0000"/>
+                </a:solidFill>
+              </a:rPr>
+              <a:t>sqrt</a:t>
+            </a:r>
+            <a:r>
+              <a:rPr lang="en-NZ" sz="2800" dirty="0" smtClean="0">
+                <a:solidFill>
+                  <a:srgbClr val="FF0000"/>
+                </a:solidFill>
+              </a:rPr>
+              <a:t>(N*M))</a:t>
+            </a:r>
+            <a:endParaRPr lang="en-NZ" sz="2800" dirty="0">
+              <a:solidFill>
+                <a:srgbClr val="FF0000"/>
+              </a:solidFill>
+            </a:endParaRPr>
+          </a:p>
+        </p:txBody>
+      </p:sp>
+      <p:sp>
+        <p:nvSpPr>
+          <p:cNvPr id="13" name="Rectangle 12"/>
+          <p:cNvSpPr/>
+          <p:nvPr/>
+        </p:nvSpPr>
+        <p:spPr>
+          <a:xfrm>
+            <a:off x="8174793" y="2100268"/>
+            <a:ext cx="1359668" cy="523220"/>
+          </a:xfrm>
+          <a:prstGeom prst="rect">
+            <a:avLst/>
+          </a:prstGeom>
+        </p:spPr>
+        <p:txBody>
+          <a:bodyPr wrap="none">
+            <a:spAutoFit/>
+          </a:bodyPr>
+          <a:lstStyle/>
+          <a:p>
+            <a:r>
+              <a:rPr lang="en-NZ" sz="2800" dirty="0" smtClean="0">
+                <a:solidFill>
+                  <a:schemeClr val="accent1">
+                    <a:lumMod val="75000"/>
+                  </a:schemeClr>
+                </a:solidFill>
+              </a:rPr>
+              <a:t>O(N*M)</a:t>
+            </a:r>
+            <a:endParaRPr lang="en-NZ" sz="2800" dirty="0">
+              <a:solidFill>
+                <a:schemeClr val="accent1">
+                  <a:lumMod val="75000"/>
+                </a:schemeClr>
+              </a:solidFill>
+            </a:endParaRPr>
+          </a:p>
+        </p:txBody>
+      </p:sp>
+    </p:spTree>
+    <p:extLst>
+      <p:ext uri="{BB962C8B-B14F-4D97-AF65-F5344CB8AC3E}">
+        <p14:creationId xmlns:p14="http://schemas.microsoft.com/office/powerpoint/2010/main" val="873658243"/>
       </p:ext>
     </p:extLst>
   </p:cSld>

</xml_diff>